<commit_message>
Updated deck with sentiment analysis url
</commit_message>
<xml_diff>
--- a/Introduction to Azure Machine Learning - spanish.pptx
+++ b/Introduction to Azure Machine Learning - spanish.pptx
@@ -209,7 +209,7 @@
           <a:p>
             <a:fld id="{7E402BD2-B4BA-4330-8747-1DB2D9EC268B}" type="datetimeFigureOut">
               <a:rPr lang="en-US" smtClean="0"/>
-              <a:t>03/10/2015</a:t>
+              <a:t>12/10/2015</a:t>
             </a:fld>
             <a:endParaRPr lang="en-US"/>
           </a:p>
@@ -18612,7 +18612,7 @@
           <a:p>
             <a:fld id="{70D5C55E-1E1D-4EFE-8DF0-7DF6077102C2}" type="datetimeFigureOut">
               <a:rPr lang="en-US" smtClean="0"/>
-              <a:t>03/10/2015</a:t>
+              <a:t>12/10/2015</a:t>
             </a:fld>
             <a:endParaRPr lang="en-US"/>
           </a:p>
@@ -18874,7 +18874,7 @@
           <a:p>
             <a:fld id="{70D5C55E-1E1D-4EFE-8DF0-7DF6077102C2}" type="datetimeFigureOut">
               <a:rPr lang="en-US" smtClean="0"/>
-              <a:t>03/10/2015</a:t>
+              <a:t>12/10/2015</a:t>
             </a:fld>
             <a:endParaRPr lang="en-US"/>
           </a:p>
@@ -30879,9 +30879,27 @@
             </a:br>
             <a:r>
               <a:rPr lang="en-US" sz="8000" dirty="0" smtClean="0"/>
-              <a:t>Twitter Sentiment Analysis</a:t>
-            </a:r>
-            <a:endParaRPr lang="en-US" sz="8000" dirty="0"/>
+              <a:t>Twitter Sentiment </a:t>
+            </a:r>
+            <a:r>
+              <a:rPr lang="en-US" sz="8000" dirty="0" smtClean="0"/>
+              <a:t>Analysis</a:t>
+            </a:r>
+            <a:br>
+              <a:rPr lang="en-US" sz="8000" dirty="0" smtClean="0"/>
+            </a:br>
+            <a:r>
+              <a:rPr lang="en-US" sz="4400" dirty="0"/>
+              <a:t/>
+            </a:r>
+            <a:br>
+              <a:rPr lang="en-US" sz="4400" dirty="0"/>
+            </a:br>
+            <a:r>
+              <a:rPr lang="en-US" sz="4400" dirty="0"/>
+              <a:t>http://twittersentimentanalysisuy.azurewebsites.net/</a:t>
+            </a:r>
+            <a:endParaRPr lang="en-US" sz="4400" dirty="0"/>
           </a:p>
         </p:txBody>
       </p:sp>

</xml_diff>